<commit_message>
Atualização da apresentação do projeto
</commit_message>
<xml_diff>
--- a/Apresentação Chatbot.pptx
+++ b/Apresentação Chatbot.pptx
@@ -6,8 +6,9 @@
   </p:sldMasterIdLst>
   <p:sldIdLst>
     <p:sldId id="256" r:id="rId2"/>
-    <p:sldId id="258" r:id="rId3"/>
+    <p:sldId id="259" r:id="rId3"/>
     <p:sldId id="257" r:id="rId4"/>
+    <p:sldId id="258" r:id="rId5"/>
   </p:sldIdLst>
   <p:sldSz cx="12192000" cy="6858000"/>
   <p:notesSz cx="12192000" cy="6858000"/>
@@ -265,7 +266,7 @@
             </a:pPr>
             <a:fld id="{A52CD36C-FFFC-45D1-A09B-F3EE7A585A1E}" type="datetimeFigureOut">
               <a:rPr lang="pt-BR"/>
-              <a:t>14/04/2024</a:t>
+              <a:t>15/04/2024</a:t>
             </a:fld>
             <a:endParaRPr lang="pt-BR"/>
           </a:p>
@@ -456,7 +457,7 @@
             </a:pPr>
             <a:fld id="{A52CD36C-FFFC-45D1-A09B-F3EE7A585A1E}" type="datetimeFigureOut">
               <a:rPr lang="pt-BR"/>
-              <a:t>14/04/2024</a:t>
+              <a:t>15/04/2024</a:t>
             </a:fld>
             <a:endParaRPr lang="pt-BR"/>
           </a:p>
@@ -657,7 +658,7 @@
             </a:pPr>
             <a:fld id="{A52CD36C-FFFC-45D1-A09B-F3EE7A585A1E}" type="datetimeFigureOut">
               <a:rPr lang="pt-BR"/>
-              <a:t>14/04/2024</a:t>
+              <a:t>15/04/2024</a:t>
             </a:fld>
             <a:endParaRPr lang="pt-BR"/>
           </a:p>
@@ -848,7 +849,7 @@
             </a:pPr>
             <a:fld id="{A52CD36C-FFFC-45D1-A09B-F3EE7A585A1E}" type="datetimeFigureOut">
               <a:rPr lang="pt-BR"/>
-              <a:t>14/04/2024</a:t>
+              <a:t>15/04/2024</a:t>
             </a:fld>
             <a:endParaRPr lang="pt-BR"/>
           </a:p>
@@ -1104,7 +1105,7 @@
             </a:pPr>
             <a:fld id="{A52CD36C-FFFC-45D1-A09B-F3EE7A585A1E}" type="datetimeFigureOut">
               <a:rPr lang="pt-BR"/>
-              <a:t>14/04/2024</a:t>
+              <a:t>15/04/2024</a:t>
             </a:fld>
             <a:endParaRPr lang="pt-BR"/>
           </a:p>
@@ -1371,7 +1372,7 @@
             </a:pPr>
             <a:fld id="{A52CD36C-FFFC-45D1-A09B-F3EE7A585A1E}" type="datetimeFigureOut">
               <a:rPr lang="pt-BR"/>
-              <a:t>14/04/2024</a:t>
+              <a:t>15/04/2024</a:t>
             </a:fld>
             <a:endParaRPr lang="pt-BR"/>
           </a:p>
@@ -1779,7 +1780,7 @@
             </a:pPr>
             <a:fld id="{A52CD36C-FFFC-45D1-A09B-F3EE7A585A1E}" type="datetimeFigureOut">
               <a:rPr lang="pt-BR"/>
-              <a:t>14/04/2024</a:t>
+              <a:t>15/04/2024</a:t>
             </a:fld>
             <a:endParaRPr lang="pt-BR"/>
           </a:p>
@@ -1904,7 +1905,7 @@
             </a:pPr>
             <a:fld id="{A52CD36C-FFFC-45D1-A09B-F3EE7A585A1E}" type="datetimeFigureOut">
               <a:rPr lang="pt-BR"/>
-              <a:t>14/04/2024</a:t>
+              <a:t>15/04/2024</a:t>
             </a:fld>
             <a:endParaRPr lang="pt-BR"/>
           </a:p>
@@ -2003,7 +2004,7 @@
             </a:pPr>
             <a:fld id="{A52CD36C-FFFC-45D1-A09B-F3EE7A585A1E}" type="datetimeFigureOut">
               <a:rPr lang="pt-BR"/>
-              <a:t>14/04/2024</a:t>
+              <a:t>15/04/2024</a:t>
             </a:fld>
             <a:endParaRPr lang="pt-BR"/>
           </a:p>
@@ -2304,7 +2305,7 @@
             </a:pPr>
             <a:fld id="{A52CD36C-FFFC-45D1-A09B-F3EE7A585A1E}" type="datetimeFigureOut">
               <a:rPr lang="pt-BR"/>
-              <a:t>14/04/2024</a:t>
+              <a:t>15/04/2024</a:t>
             </a:fld>
             <a:endParaRPr lang="pt-BR"/>
           </a:p>
@@ -2570,7 +2571,7 @@
             </a:pPr>
             <a:fld id="{A52CD36C-FFFC-45D1-A09B-F3EE7A585A1E}" type="datetimeFigureOut">
               <a:rPr lang="pt-BR"/>
-              <a:t>14/04/2024</a:t>
+              <a:t>15/04/2024</a:t>
             </a:fld>
             <a:endParaRPr lang="pt-BR"/>
           </a:p>
@@ -2804,7 +2805,7 @@
             </a:pPr>
             <a:fld id="{A52CD36C-FFFC-45D1-A09B-F3EE7A585A1E}" type="datetimeFigureOut">
               <a:rPr lang="pt-BR"/>
-              <a:t>14/04/2024</a:t>
+              <a:t>15/04/2024</a:t>
             </a:fld>
             <a:endParaRPr lang="pt-BR"/>
           </a:p>
@@ -3492,7 +3493,7 @@
     </p:spTree>
     <p:extLst>
       <p:ext uri="{BB962C8B-B14F-4D97-AF65-F5344CB8AC3E}">
-        <p14:creationId xmlns:p14="http://schemas.microsoft.com/office/powerpoint/2010/main" val="2077403520"/>
+        <p14:creationId xmlns:p14="http://schemas.microsoft.com/office/powerpoint/2010/main" val="433907576"/>
       </p:ext>
     </p:extLst>
   </p:cSld>
@@ -3715,6 +3716,166 @@
         </p:spPr>
       </p:pic>
     </p:spTree>
+  </p:cSld>
+  <p:clrMapOvr>
+    <a:masterClrMapping/>
+  </p:clrMapOvr>
+</p:sld>
+</file>
+
+<file path=ppt/slides/slide4.xml><?xml version="1.0" encoding="utf-8"?>
+<p:sld xmlns:a="http://schemas.openxmlformats.org/drawingml/2006/main" xmlns:r="http://schemas.openxmlformats.org/officeDocument/2006/relationships" xmlns:p="http://schemas.openxmlformats.org/presentationml/2006/main" showMasterPhAnim="0">
+  <p:cSld>
+    <p:spTree>
+      <p:nvGrpSpPr>
+        <p:cNvPr id="1" name=""/>
+        <p:cNvGrpSpPr/>
+        <p:nvPr/>
+      </p:nvGrpSpPr>
+      <p:grpSpPr bwMode="auto">
+        <a:xfrm>
+          <a:off x="0" y="0"/>
+          <a:ext cx="0" cy="0"/>
+          <a:chOff x="0" y="0"/>
+          <a:chExt cx="0" cy="0"/>
+        </a:xfrm>
+      </p:grpSpPr>
+      <p:sp>
+        <p:nvSpPr>
+          <p:cNvPr id="3" name="Espaço Reservado para Conteúdo 2"/>
+          <p:cNvSpPr>
+            <a:spLocks noGrp="1"/>
+          </p:cNvSpPr>
+          <p:nvPr>
+            <p:ph idx="1"/>
+          </p:nvPr>
+        </p:nvSpPr>
+        <p:spPr bwMode="auto"/>
+        <p:txBody>
+          <a:bodyPr vertOverflow="overflow" horzOverflow="overflow" vert="horz" wrap="square" lIns="91440" tIns="45720" rIns="91440" bIns="45720" numCol="1" spcCol="0" rtlCol="0" fromWordArt="0" anchor="t" anchorCtr="0" forceAA="0" compatLnSpc="0">
+            <a:normAutofit fontScale="95000"/>
+          </a:bodyPr>
+          <a:lstStyle/>
+          <a:p>
+            <a:pPr marL="0" indent="0">
+              <a:buNone/>
+              <a:defRPr/>
+            </a:pPr>
+            <a:r>
+              <a:rPr lang="pt-BR" dirty="0"/>
+              <a:t>MOTIVO DO TEMA</a:t>
+            </a:r>
+          </a:p>
+          <a:p>
+            <a:pPr>
+              <a:defRPr/>
+            </a:pPr>
+            <a:r>
+              <a:rPr lang="en-US" dirty="0"/>
+              <a:t>As </a:t>
+            </a:r>
+            <a:r>
+              <a:rPr lang="en-US" dirty="0" err="1"/>
+              <a:t>funcionalidades</a:t>
+            </a:r>
+            <a:r>
+              <a:rPr lang="en-US" dirty="0"/>
+              <a:t> do site e o </a:t>
+            </a:r>
+            <a:r>
+              <a:rPr lang="en-US" dirty="0" err="1"/>
+              <a:t>aplicativo</a:t>
+            </a:r>
+            <a:r>
+              <a:rPr lang="en-US" dirty="0"/>
+              <a:t> </a:t>
+            </a:r>
+            <a:r>
+              <a:rPr lang="en-US"/>
+              <a:t>relacionado </a:t>
+            </a:r>
+            <a:r>
+              <a:rPr lang="en-US" dirty="0" err="1"/>
+              <a:t>ao</a:t>
+            </a:r>
+            <a:r>
+              <a:rPr lang="en-US" dirty="0"/>
+              <a:t> DETRAN </a:t>
+            </a:r>
+            <a:r>
+              <a:rPr lang="en-US" dirty="0" err="1"/>
+              <a:t>não</a:t>
+            </a:r>
+            <a:r>
+              <a:rPr lang="en-US" dirty="0"/>
+              <a:t> </a:t>
+            </a:r>
+            <a:r>
+              <a:rPr lang="en-US" dirty="0" err="1"/>
+              <a:t>estavam</a:t>
+            </a:r>
+            <a:r>
+              <a:rPr lang="en-US" dirty="0"/>
+              <a:t> </a:t>
+            </a:r>
+            <a:r>
+              <a:rPr lang="en-US" dirty="0" err="1"/>
+              <a:t>funcionando</a:t>
+            </a:r>
+            <a:r>
+              <a:rPr lang="en-US" dirty="0"/>
+              <a:t> </a:t>
+            </a:r>
+            <a:r>
+              <a:rPr lang="en-US" dirty="0" err="1"/>
+              <a:t>como</a:t>
+            </a:r>
+            <a:r>
+              <a:rPr lang="en-US" dirty="0"/>
+              <a:t> </a:t>
+            </a:r>
+            <a:r>
+              <a:rPr lang="en-US" dirty="0" err="1"/>
+              <a:t>deveriam</a:t>
+            </a:r>
+            <a:r>
+              <a:rPr lang="en-US" dirty="0"/>
+              <a:t>.</a:t>
+            </a:r>
+          </a:p>
+          <a:p>
+            <a:pPr>
+              <a:defRPr/>
+            </a:pPr>
+            <a:r>
+              <a:rPr lang="en-US" dirty="0"/>
+              <a:t>Site </a:t>
+            </a:r>
+            <a:r>
+              <a:rPr lang="en-US" dirty="0" err="1"/>
+              <a:t>não</a:t>
+            </a:r>
+            <a:r>
+              <a:rPr lang="en-US" dirty="0"/>
+              <a:t> </a:t>
+            </a:r>
+            <a:r>
+              <a:rPr lang="en-US" dirty="0" err="1"/>
+              <a:t>possui</a:t>
+            </a:r>
+            <a:r>
+              <a:rPr lang="en-US" dirty="0"/>
+              <a:t> um chatbot</a:t>
+            </a:r>
+          </a:p>
+        </p:txBody>
+      </p:sp>
+    </p:spTree>
+    <p:extLst>
+      <p:ext uri="{BB962C8B-B14F-4D97-AF65-F5344CB8AC3E}">
+        <p14:creationId xmlns:p14="http://schemas.microsoft.com/office/powerpoint/2010/main" val="2077403520"/>
+      </p:ext>
+    </p:extLst>
   </p:cSld>
   <p:clrMapOvr>
     <a:masterClrMapping/>

</xml_diff>